<commit_message>
Poster and website update
</commit_message>
<xml_diff>
--- a/Poster/Poster.pptx
+++ b/Poster/Poster.pptx
@@ -3108,8 +3108,8 @@
         </p:nvSpPr>
         <p:spPr>
           <a:xfrm>
-            <a:off x="2161099" y="600358"/>
-            <a:ext cx="5544616" cy="707886"/>
+            <a:off x="1068152" y="420992"/>
+            <a:ext cx="7560840" cy="830997"/>
           </a:xfrm>
           <a:prstGeom prst="rect">
             <a:avLst/>
@@ -3124,10 +3124,10 @@
           <a:p>
             <a:pPr algn="ctr"/>
             <a:r>
-              <a:rPr lang="en-GB" sz="4000" dirty="0" smtClean="0"/>
+              <a:rPr lang="en-GB" sz="4800" dirty="0" smtClean="0"/>
               <a:t>R-LOC NETWORK LOBBY</a:t>
             </a:r>
-            <a:endParaRPr lang="en-GB" sz="4000" dirty="0"/>
+            <a:endParaRPr lang="en-GB" sz="4800" dirty="0"/>
           </a:p>
         </p:txBody>
       </p:sp>
@@ -3139,8 +3139,8 @@
         </p:nvSpPr>
         <p:spPr>
           <a:xfrm>
-            <a:off x="1945075" y="1864296"/>
-            <a:ext cx="5976664" cy="1246495"/>
+            <a:off x="48072" y="2185793"/>
+            <a:ext cx="5112568" cy="2554545"/>
           </a:xfrm>
           <a:prstGeom prst="rect">
             <a:avLst/>
@@ -3154,23 +3154,38 @@
           <a:lstStyle/>
           <a:p>
             <a:r>
-              <a:rPr lang="en-GB" dirty="0" smtClean="0"/>
-              <a:t>For my project I worked on integrating a lobby into the game Firelock being developed R-LOC studios.</a:t>
-            </a:r>
-            <a:endParaRPr lang="en-GB" dirty="0"/>
-          </a:p>
-        </p:txBody>
-      </p:sp>
-      <p:sp>
-        <p:nvSpPr>
-          <p:cNvPr id="6" name="TextBox 5"/>
+              <a:rPr lang="en-GB" sz="2000" dirty="0" smtClean="0"/>
+              <a:t>For my project I worked on integrating a lobby into the game Firelock being developed R-LOC studios</a:t>
+            </a:r>
+            <a:r>
+              <a:rPr lang="en-GB" sz="2000" dirty="0" smtClean="0"/>
+              <a:t>.</a:t>
+            </a:r>
+          </a:p>
+          <a:p>
+            <a:endParaRPr lang="en-GB" sz="2000" dirty="0"/>
+          </a:p>
+          <a:p>
+            <a:r>
+              <a:rPr lang="en-GB" sz="2000" dirty="0"/>
+              <a:t>The lobby system builds upon the existing free network lobby system that was created by unity.</a:t>
+            </a:r>
+          </a:p>
+          <a:p>
+            <a:endParaRPr lang="en-GB" sz="2000" dirty="0"/>
+          </a:p>
+        </p:txBody>
+      </p:sp>
+      <p:sp>
+        <p:nvSpPr>
+          <p:cNvPr id="7" name="TextBox 6"/>
           <p:cNvSpPr txBox="1"/>
           <p:nvPr/>
         </p:nvSpPr>
         <p:spPr>
           <a:xfrm>
-            <a:off x="456765" y="4528592"/>
-            <a:ext cx="4896544" cy="1246495"/>
+            <a:off x="5232648" y="5352846"/>
+            <a:ext cx="3824530" cy="1938992"/>
           </a:xfrm>
           <a:prstGeom prst="rect">
             <a:avLst/>
@@ -3184,40 +3199,10 @@
           <a:lstStyle/>
           <a:p>
             <a:r>
-              <a:rPr lang="en-GB" dirty="0" smtClean="0"/>
-              <a:t>The lobby system builds upon the existing free network lobby system that was created by unity.</a:t>
-            </a:r>
-            <a:endParaRPr lang="en-GB" dirty="0"/>
-          </a:p>
-        </p:txBody>
-      </p:sp>
-      <p:sp>
-        <p:nvSpPr>
-          <p:cNvPr id="7" name="TextBox 6"/>
-          <p:cNvSpPr txBox="1"/>
-          <p:nvPr/>
-        </p:nvSpPr>
-        <p:spPr>
-          <a:xfrm>
-            <a:off x="4791243" y="6829099"/>
-            <a:ext cx="4845302" cy="2400657"/>
-          </a:xfrm>
-          <a:prstGeom prst="rect">
-            <a:avLst/>
-          </a:prstGeom>
-          <a:noFill/>
-        </p:spPr>
-        <p:txBody>
-          <a:bodyPr wrap="square" rtlCol="0">
-            <a:spAutoFit/>
-          </a:bodyPr>
-          <a:lstStyle/>
-          <a:p>
-            <a:r>
-              <a:rPr lang="en-GB" dirty="0" smtClean="0"/>
+              <a:rPr lang="en-GB" sz="2000" dirty="0" smtClean="0"/>
               <a:t>For my contribution I worked on creating a game Settings class that controlled what the game settings are when in the lobby, and then when the game starts it uses those settings.</a:t>
             </a:r>
-            <a:endParaRPr lang="en-GB" dirty="0"/>
+            <a:endParaRPr lang="en-GB" sz="2000" dirty="0"/>
           </a:p>
         </p:txBody>
       </p:sp>
@@ -3244,8 +3229,8 @@
         </p:blipFill>
         <p:spPr bwMode="auto">
           <a:xfrm>
-            <a:off x="5952728" y="4024537"/>
-            <a:ext cx="3312368" cy="1945114"/>
+            <a:off x="5232648" y="1864296"/>
+            <a:ext cx="4169204" cy="2448272"/>
           </a:xfrm>
           <a:prstGeom prst="rect">
             <a:avLst/>
@@ -3294,13 +3279,22 @@
         </p:blipFill>
         <p:spPr bwMode="auto">
           <a:xfrm>
-            <a:off x="454993" y="6832848"/>
-            <a:ext cx="4212468" cy="2473677"/>
+            <a:off x="264922" y="5032648"/>
+            <a:ext cx="4392488" cy="2579389"/>
           </a:xfrm>
           <a:prstGeom prst="rect">
             <a:avLst/>
           </a:prstGeom>
-          <a:noFill/>
+          <a:ln>
+            <a:noFill/>
+          </a:ln>
+          <a:effectLst>
+            <a:outerShdw blurRad="190500" algn="tl" rotWithShape="0">
+              <a:srgbClr val="000000">
+                <a:alpha val="70000"/>
+              </a:srgbClr>
+            </a:outerShdw>
+          </a:effectLst>
           <a:extLst>
             <a:ext uri="{909E8E84-426E-40DD-AFC4-6F175D3DCCD1}">
               <a14:hiddenFill xmlns:a14="http://schemas.microsoft.com/office/drawing/2010/main">
@@ -3342,6 +3336,194 @@
           </a:fontRef>
         </p:style>
       </p:cxnSp>
+      <p:pic>
+        <p:nvPicPr>
+          <p:cNvPr id="2" name="Picture 2" descr="D:\Programs\Dropbox\Dropbox\Screenshots\Screenshot 2017-04-23 15.27.05.png"/>
+          <p:cNvPicPr>
+            <a:picLocks noChangeAspect="1" noChangeArrowheads="1"/>
+          </p:cNvPicPr>
+          <p:nvPr/>
+        </p:nvPicPr>
+        <p:blipFill rotWithShape="1">
+          <a:blip r:embed="rId4" cstate="print">
+            <a:extLst>
+              <a:ext uri="{28A0092B-C50C-407E-A947-70E740481C1C}">
+                <a14:useLocalDpi xmlns:a14="http://schemas.microsoft.com/office/drawing/2010/main" val="0"/>
+              </a:ext>
+            </a:extLst>
+          </a:blip>
+          <a:srcRect l="7602" t="20909" r="65243" b="26127"/>
+          <a:stretch/>
+        </p:blipFill>
+        <p:spPr bwMode="auto">
+          <a:xfrm>
+            <a:off x="660908" y="8345016"/>
+            <a:ext cx="1800258" cy="1951004"/>
+          </a:xfrm>
+          <a:prstGeom prst="rect">
+            <a:avLst/>
+          </a:prstGeom>
+          <a:ln>
+            <a:noFill/>
+          </a:ln>
+          <a:effectLst>
+            <a:outerShdw blurRad="190500" algn="tl" rotWithShape="0">
+              <a:srgbClr val="000000">
+                <a:alpha val="70000"/>
+              </a:srgbClr>
+            </a:outerShdw>
+          </a:effectLst>
+          <a:extLst>
+            <a:ext uri="{909E8E84-426E-40DD-AFC4-6F175D3DCCD1}">
+              <a14:hiddenFill xmlns:a14="http://schemas.microsoft.com/office/drawing/2010/main">
+                <a:solidFill>
+                  <a:srgbClr val="FFFFFF"/>
+                </a:solidFill>
+              </a14:hiddenFill>
+            </a:ext>
+          </a:extLst>
+        </p:spPr>
+      </p:pic>
+      <p:sp>
+        <p:nvSpPr>
+          <p:cNvPr id="10" name="TextBox 9"/>
+          <p:cNvSpPr txBox="1"/>
+          <p:nvPr/>
+        </p:nvSpPr>
+        <p:spPr>
+          <a:xfrm>
+            <a:off x="192088" y="10721280"/>
+            <a:ext cx="3456384" cy="1323439"/>
+          </a:xfrm>
+          <a:prstGeom prst="rect">
+            <a:avLst/>
+          </a:prstGeom>
+          <a:noFill/>
+        </p:spPr>
+        <p:txBody>
+          <a:bodyPr wrap="square" rtlCol="0">
+            <a:spAutoFit/>
+          </a:bodyPr>
+          <a:lstStyle/>
+          <a:p>
+            <a:pPr algn="ctr"/>
+            <a:r>
+              <a:rPr lang="en-GB" sz="2000" dirty="0" smtClean="0"/>
+              <a:t>This is a small bit of code that I wrote that controls what map loads in unity based on what the user chooses.</a:t>
+            </a:r>
+            <a:endParaRPr lang="en-GB" sz="2000" dirty="0"/>
+          </a:p>
+        </p:txBody>
+      </p:sp>
+      <p:sp>
+        <p:nvSpPr>
+          <p:cNvPr id="11" name="TextBox 10"/>
+          <p:cNvSpPr txBox="1"/>
+          <p:nvPr/>
+        </p:nvSpPr>
+        <p:spPr>
+          <a:xfrm>
+            <a:off x="48072" y="1628698"/>
+            <a:ext cx="5976664" cy="584775"/>
+          </a:xfrm>
+          <a:prstGeom prst="rect">
+            <a:avLst/>
+          </a:prstGeom>
+          <a:noFill/>
+        </p:spPr>
+        <p:txBody>
+          <a:bodyPr wrap="square" rtlCol="0">
+            <a:spAutoFit/>
+          </a:bodyPr>
+          <a:lstStyle/>
+          <a:p>
+            <a:r>
+              <a:rPr lang="en-GB" sz="3200" b="1" dirty="0" smtClean="0"/>
+              <a:t>Introduction</a:t>
+            </a:r>
+            <a:endParaRPr lang="en-GB" sz="3200" b="1" dirty="0"/>
+          </a:p>
+        </p:txBody>
+      </p:sp>
+      <p:pic>
+        <p:nvPicPr>
+          <p:cNvPr id="3" name="Picture 3" descr="D:\Programs\Dropbox\Dropbox\Screenshots\Screenshot 2017-04-23 14.31.09.png"/>
+          <p:cNvPicPr>
+            <a:picLocks noChangeAspect="1" noChangeArrowheads="1"/>
+          </p:cNvPicPr>
+          <p:nvPr/>
+        </p:nvPicPr>
+        <p:blipFill rotWithShape="1">
+          <a:blip r:embed="rId5" cstate="print">
+            <a:extLst>
+              <a:ext uri="{28A0092B-C50C-407E-A947-70E740481C1C}">
+                <a14:useLocalDpi xmlns:a14="http://schemas.microsoft.com/office/drawing/2010/main" val="0"/>
+              </a:ext>
+            </a:extLst>
+          </a:blip>
+          <a:srcRect l="34326" t="11783" r="25556" b="38661"/>
+          <a:stretch/>
+        </p:blipFill>
+        <p:spPr bwMode="auto">
+          <a:xfrm>
+            <a:off x="5342284" y="8345016"/>
+            <a:ext cx="3080655" cy="2088232"/>
+          </a:xfrm>
+          <a:prstGeom prst="rect">
+            <a:avLst/>
+          </a:prstGeom>
+          <a:ln>
+            <a:noFill/>
+          </a:ln>
+          <a:effectLst>
+            <a:outerShdw blurRad="190500" algn="tl" rotWithShape="0">
+              <a:srgbClr val="000000">
+                <a:alpha val="70000"/>
+              </a:srgbClr>
+            </a:outerShdw>
+          </a:effectLst>
+          <a:extLst>
+            <a:ext uri="{909E8E84-426E-40DD-AFC4-6F175D3DCCD1}">
+              <a14:hiddenFill xmlns:a14="http://schemas.microsoft.com/office/drawing/2010/main">
+                <a:solidFill>
+                  <a:srgbClr val="FFFFFF"/>
+                </a:solidFill>
+              </a14:hiddenFill>
+            </a:ext>
+          </a:extLst>
+        </p:spPr>
+      </p:pic>
+      <p:sp>
+        <p:nvSpPr>
+          <p:cNvPr id="13" name="TextBox 12"/>
+          <p:cNvSpPr txBox="1"/>
+          <p:nvPr/>
+        </p:nvSpPr>
+        <p:spPr>
+          <a:xfrm>
+            <a:off x="4966555" y="10721279"/>
+            <a:ext cx="3456384" cy="1631216"/>
+          </a:xfrm>
+          <a:prstGeom prst="rect">
+            <a:avLst/>
+          </a:prstGeom>
+          <a:noFill/>
+        </p:spPr>
+        <p:txBody>
+          <a:bodyPr wrap="square" rtlCol="0">
+            <a:spAutoFit/>
+          </a:bodyPr>
+          <a:lstStyle/>
+          <a:p>
+            <a:pPr algn="ctr"/>
+            <a:r>
+              <a:rPr lang="en-GB" sz="2000" dirty="0" smtClean="0"/>
+              <a:t>The above image shows how the UI is linked together, so the user has to select a map in order for the continue button to work.</a:t>
+            </a:r>
+            <a:endParaRPr lang="en-GB" sz="2000" dirty="0"/>
+          </a:p>
+        </p:txBody>
+      </p:sp>
     </p:spTree>
     <p:extLst>
       <p:ext uri="{BB962C8B-B14F-4D97-AF65-F5344CB8AC3E}">

</xml_diff>

<commit_message>
Poster and trello copied over
</commit_message>
<xml_diff>
--- a/Poster/Poster.pptx
+++ b/Poster/Poster.pptx
@@ -288,7 +288,7 @@
           <a:p>
             <a:fld id="{8EB01C77-BEAE-4EBC-926D-A7A4CBAB5A88}" type="datetimeFigureOut">
               <a:rPr lang="en-GB" smtClean="0"/>
-              <a:t>23/04/2017</a:t>
+              <a:t>24/04/2017</a:t>
             </a:fld>
             <a:endParaRPr lang="en-GB"/>
           </a:p>
@@ -458,7 +458,7 @@
           <a:p>
             <a:fld id="{8EB01C77-BEAE-4EBC-926D-A7A4CBAB5A88}" type="datetimeFigureOut">
               <a:rPr lang="en-GB" smtClean="0"/>
-              <a:t>23/04/2017</a:t>
+              <a:t>24/04/2017</a:t>
             </a:fld>
             <a:endParaRPr lang="en-GB"/>
           </a:p>
@@ -638,7 +638,7 @@
           <a:p>
             <a:fld id="{8EB01C77-BEAE-4EBC-926D-A7A4CBAB5A88}" type="datetimeFigureOut">
               <a:rPr lang="en-GB" smtClean="0"/>
-              <a:t>23/04/2017</a:t>
+              <a:t>24/04/2017</a:t>
             </a:fld>
             <a:endParaRPr lang="en-GB"/>
           </a:p>
@@ -808,7 +808,7 @@
           <a:p>
             <a:fld id="{8EB01C77-BEAE-4EBC-926D-A7A4CBAB5A88}" type="datetimeFigureOut">
               <a:rPr lang="en-GB" smtClean="0"/>
-              <a:t>23/04/2017</a:t>
+              <a:t>24/04/2017</a:t>
             </a:fld>
             <a:endParaRPr lang="en-GB"/>
           </a:p>
@@ -1054,7 +1054,7 @@
           <a:p>
             <a:fld id="{8EB01C77-BEAE-4EBC-926D-A7A4CBAB5A88}" type="datetimeFigureOut">
               <a:rPr lang="en-GB" smtClean="0"/>
-              <a:t>23/04/2017</a:t>
+              <a:t>24/04/2017</a:t>
             </a:fld>
             <a:endParaRPr lang="en-GB"/>
           </a:p>
@@ -1342,7 +1342,7 @@
           <a:p>
             <a:fld id="{8EB01C77-BEAE-4EBC-926D-A7A4CBAB5A88}" type="datetimeFigureOut">
               <a:rPr lang="en-GB" smtClean="0"/>
-              <a:t>23/04/2017</a:t>
+              <a:t>24/04/2017</a:t>
             </a:fld>
             <a:endParaRPr lang="en-GB"/>
           </a:p>
@@ -1769,7 +1769,7 @@
           <a:p>
             <a:fld id="{8EB01C77-BEAE-4EBC-926D-A7A4CBAB5A88}" type="datetimeFigureOut">
               <a:rPr lang="en-GB" smtClean="0"/>
-              <a:t>23/04/2017</a:t>
+              <a:t>24/04/2017</a:t>
             </a:fld>
             <a:endParaRPr lang="en-GB"/>
           </a:p>
@@ -1887,7 +1887,7 @@
           <a:p>
             <a:fld id="{8EB01C77-BEAE-4EBC-926D-A7A4CBAB5A88}" type="datetimeFigureOut">
               <a:rPr lang="en-GB" smtClean="0"/>
-              <a:t>23/04/2017</a:t>
+              <a:t>24/04/2017</a:t>
             </a:fld>
             <a:endParaRPr lang="en-GB"/>
           </a:p>
@@ -1982,7 +1982,7 @@
           <a:p>
             <a:fld id="{8EB01C77-BEAE-4EBC-926D-A7A4CBAB5A88}" type="datetimeFigureOut">
               <a:rPr lang="en-GB" smtClean="0"/>
-              <a:t>23/04/2017</a:t>
+              <a:t>24/04/2017</a:t>
             </a:fld>
             <a:endParaRPr lang="en-GB"/>
           </a:p>
@@ -2259,7 +2259,7 @@
           <a:p>
             <a:fld id="{8EB01C77-BEAE-4EBC-926D-A7A4CBAB5A88}" type="datetimeFigureOut">
               <a:rPr lang="en-GB" smtClean="0"/>
-              <a:t>23/04/2017</a:t>
+              <a:t>24/04/2017</a:t>
             </a:fld>
             <a:endParaRPr lang="en-GB"/>
           </a:p>
@@ -2512,7 +2512,7 @@
           <a:p>
             <a:fld id="{8EB01C77-BEAE-4EBC-926D-A7A4CBAB5A88}" type="datetimeFigureOut">
               <a:rPr lang="en-GB" smtClean="0"/>
-              <a:t>23/04/2017</a:t>
+              <a:t>24/04/2017</a:t>
             </a:fld>
             <a:endParaRPr lang="en-GB"/>
           </a:p>
@@ -2725,7 +2725,7 @@
           <a:p>
             <a:fld id="{8EB01C77-BEAE-4EBC-926D-A7A4CBAB5A88}" type="datetimeFigureOut">
               <a:rPr lang="en-GB" smtClean="0"/>
-              <a:t>23/04/2017</a:t>
+              <a:t>24/04/2017</a:t>
             </a:fld>
             <a:endParaRPr lang="en-GB"/>
           </a:p>
@@ -3108,8 +3108,8 @@
         </p:nvSpPr>
         <p:spPr>
           <a:xfrm>
-            <a:off x="1068152" y="420992"/>
-            <a:ext cx="7560840" cy="830997"/>
+            <a:off x="1068152" y="169203"/>
+            <a:ext cx="7560840" cy="1569660"/>
           </a:xfrm>
           <a:prstGeom prst="rect">
             <a:avLst/>
@@ -3125,7 +3125,11 @@
             <a:pPr algn="ctr"/>
             <a:r>
               <a:rPr lang="en-GB" sz="4800" dirty="0" smtClean="0"/>
-              <a:t>R-LOC NETWORK LOBBY</a:t>
+              <a:t>R-LOC NETWORK </a:t>
+            </a:r>
+            <a:r>
+              <a:rPr lang="en-GB" sz="4800" dirty="0" smtClean="0"/>
+              <a:t>LOBBY PROTOTYPE</a:t>
             </a:r>
             <a:endParaRPr lang="en-GB" sz="4800" dirty="0"/>
           </a:p>
@@ -3139,8 +3143,8 @@
         </p:nvSpPr>
         <p:spPr>
           <a:xfrm>
-            <a:off x="48072" y="2185793"/>
-            <a:ext cx="5112568" cy="2554545"/>
+            <a:off x="48072" y="2460818"/>
+            <a:ext cx="4800500" cy="2062103"/>
           </a:xfrm>
           <a:prstGeom prst="rect">
             <a:avLst/>
@@ -3154,25 +3158,33 @@
           <a:lstStyle/>
           <a:p>
             <a:r>
-              <a:rPr lang="en-GB" sz="2000" dirty="0" smtClean="0"/>
-              <a:t>For my project I worked on integrating a lobby into the game Firelock being developed R-LOC studios</a:t>
-            </a:r>
-            <a:r>
-              <a:rPr lang="en-GB" sz="2000" dirty="0" smtClean="0"/>
-              <a:t>.</a:t>
-            </a:r>
-          </a:p>
-          <a:p>
-            <a:endParaRPr lang="en-GB" sz="2000" dirty="0"/>
-          </a:p>
-          <a:p>
-            <a:r>
-              <a:rPr lang="en-GB" sz="2000" dirty="0"/>
-              <a:t>The lobby system builds upon the existing free network lobby system that was created by unity.</a:t>
-            </a:r>
-          </a:p>
-          <a:p>
-            <a:endParaRPr lang="en-GB" sz="2000" dirty="0"/>
+              <a:rPr lang="en-GB" sz="1600" dirty="0" smtClean="0"/>
+              <a:t>For my project I worked on integrating a lobby into the game Firelock being developed R-LOC studios.</a:t>
+            </a:r>
+          </a:p>
+          <a:p>
+            <a:endParaRPr lang="en-GB" sz="1600" dirty="0"/>
+          </a:p>
+          <a:p>
+            <a:r>
+              <a:rPr lang="en-GB" sz="1600" dirty="0"/>
+              <a:t>The lobby system builds </a:t>
+            </a:r>
+            <a:r>
+              <a:rPr lang="en-GB" sz="1600" dirty="0" smtClean="0"/>
+              <a:t>extends the functionality of the </a:t>
+            </a:r>
+            <a:r>
+              <a:rPr lang="en-GB" sz="1600" dirty="0"/>
+              <a:t>existing free network lobby system that was created by unity.</a:t>
+            </a:r>
+          </a:p>
+          <a:p>
+            <a:r>
+              <a:rPr lang="en-GB" sz="1600" dirty="0" smtClean="0"/>
+              <a:t>This is a product that can be fairly easily attached to most unity projects to create a lobby for.</a:t>
+            </a:r>
+            <a:endParaRPr lang="en-GB" sz="1600" dirty="0"/>
           </a:p>
         </p:txBody>
       </p:sp>
@@ -3184,8 +3196,8 @@
         </p:nvSpPr>
         <p:spPr>
           <a:xfrm>
-            <a:off x="5232648" y="5352846"/>
-            <a:ext cx="3824530" cy="1938992"/>
+            <a:off x="6312768" y="5627871"/>
+            <a:ext cx="3032442" cy="3293209"/>
           </a:xfrm>
           <a:prstGeom prst="rect">
             <a:avLst/>
@@ -3199,10 +3211,36 @@
           <a:lstStyle/>
           <a:p>
             <a:r>
-              <a:rPr lang="en-GB" sz="2000" dirty="0" smtClean="0"/>
-              <a:t>For my contribution I worked on creating a game Settings class that controlled what the game settings are when in the lobby, and then when the game starts it uses those settings.</a:t>
-            </a:r>
-            <a:endParaRPr lang="en-GB" sz="2000" dirty="0"/>
+              <a:rPr lang="en-GB" sz="1600" dirty="0" smtClean="0"/>
+              <a:t>For my contribution I worked on creating a game </a:t>
+            </a:r>
+            <a:r>
+              <a:rPr lang="en-GB" sz="1600" dirty="0" smtClean="0"/>
+              <a:t>settings </a:t>
+            </a:r>
+            <a:r>
+              <a:rPr lang="en-GB" sz="1600" dirty="0" smtClean="0"/>
+              <a:t>class that controlled what the game settings are when in the lobby, and then when the game starts it uses those settings</a:t>
+            </a:r>
+            <a:r>
+              <a:rPr lang="en-GB" sz="1600" dirty="0" smtClean="0"/>
+              <a:t>.</a:t>
+            </a:r>
+          </a:p>
+          <a:p>
+            <a:r>
+              <a:rPr lang="en-GB" sz="1600" dirty="0" smtClean="0"/>
+              <a:t>One of the most challenging problems I faced when creating this product was not the actual networking but the UI that managed the lobby as it’s a bit of a maze to create linked </a:t>
+            </a:r>
+            <a:r>
+              <a:rPr lang="en-GB" sz="1600" dirty="0" err="1" smtClean="0"/>
+              <a:t>Uis</a:t>
+            </a:r>
+            <a:r>
+              <a:rPr lang="en-GB" sz="1600" dirty="0" smtClean="0"/>
+              <a:t> in unity.</a:t>
+            </a:r>
+            <a:endParaRPr lang="en-GB" sz="1600" dirty="0"/>
           </a:p>
         </p:txBody>
       </p:sp>
@@ -3229,8 +3267,8 @@
         </p:blipFill>
         <p:spPr bwMode="auto">
           <a:xfrm>
-            <a:off x="5232648" y="1864296"/>
-            <a:ext cx="4169204" cy="2448272"/>
+            <a:off x="5376664" y="2145564"/>
+            <a:ext cx="4035949" cy="2370021"/>
           </a:xfrm>
           <a:prstGeom prst="rect">
             <a:avLst/>
@@ -3279,7 +3317,7 @@
         </p:blipFill>
         <p:spPr bwMode="auto">
           <a:xfrm>
-            <a:off x="264922" y="5032648"/>
+            <a:off x="4584576" y="9294019"/>
             <a:ext cx="4392488" cy="2579389"/>
           </a:xfrm>
           <a:prstGeom prst="rect">
@@ -3314,7 +3352,7 @@
         </p:nvCxnSpPr>
         <p:spPr>
           <a:xfrm>
-            <a:off x="0" y="1576264"/>
+            <a:off x="0" y="1648272"/>
             <a:ext cx="9697144" cy="72008"/>
           </a:xfrm>
           <a:prstGeom prst="line">
@@ -3357,8 +3395,8 @@
         </p:blipFill>
         <p:spPr bwMode="auto">
           <a:xfrm>
-            <a:off x="660908" y="8345016"/>
-            <a:ext cx="1800258" cy="1951004"/>
+            <a:off x="318147" y="5566391"/>
+            <a:ext cx="1871382" cy="2028083"/>
           </a:xfrm>
           <a:prstGeom prst="rect">
             <a:avLst/>
@@ -3392,8 +3430,8 @@
         </p:nvSpPr>
         <p:spPr>
           <a:xfrm>
-            <a:off x="192088" y="10721280"/>
-            <a:ext cx="3456384" cy="1323439"/>
+            <a:off x="37952" y="7597641"/>
+            <a:ext cx="2507676" cy="1323439"/>
           </a:xfrm>
           <a:prstGeom prst="rect">
             <a:avLst/>
@@ -3408,10 +3446,10 @@
           <a:p>
             <a:pPr algn="ctr"/>
             <a:r>
-              <a:rPr lang="en-GB" sz="2000" dirty="0" smtClean="0"/>
+              <a:rPr lang="en-GB" sz="1600" dirty="0" smtClean="0"/>
               <a:t>This is a small bit of code that I wrote that controls what map loads in unity based on what the user chooses.</a:t>
             </a:r>
-            <a:endParaRPr lang="en-GB" sz="2000" dirty="0"/>
+            <a:endParaRPr lang="en-GB" sz="1600" dirty="0"/>
           </a:p>
         </p:txBody>
       </p:sp>
@@ -3423,7 +3461,7 @@
         </p:nvSpPr>
         <p:spPr>
           <a:xfrm>
-            <a:off x="48072" y="1628698"/>
+            <a:off x="48072" y="1903723"/>
             <a:ext cx="5976664" cy="584775"/>
           </a:xfrm>
           <a:prstGeom prst="rect">
@@ -3466,8 +3504,8 @@
         </p:blipFill>
         <p:spPr bwMode="auto">
           <a:xfrm>
-            <a:off x="5342284" y="8345016"/>
-            <a:ext cx="3080655" cy="2088232"/>
+            <a:off x="2584559" y="5569558"/>
+            <a:ext cx="2991921" cy="2028083"/>
           </a:xfrm>
           <a:prstGeom prst="rect">
             <a:avLst/>
@@ -3501,8 +3539,8 @@
         </p:nvSpPr>
         <p:spPr>
           <a:xfrm>
-            <a:off x="4966555" y="10721279"/>
-            <a:ext cx="3456384" cy="1631216"/>
+            <a:off x="2568352" y="7610935"/>
+            <a:ext cx="2991921" cy="1077218"/>
           </a:xfrm>
           <a:prstGeom prst="rect">
             <a:avLst/>
@@ -3517,10 +3555,114 @@
           <a:p>
             <a:pPr algn="ctr"/>
             <a:r>
-              <a:rPr lang="en-GB" sz="2000" dirty="0" smtClean="0"/>
+              <a:rPr lang="en-GB" sz="1600" dirty="0" smtClean="0"/>
               <a:t>The above image shows how the UI is linked together, so the user has to select a map in order for the continue button to work.</a:t>
             </a:r>
-            <a:endParaRPr lang="en-GB" sz="2000" dirty="0"/>
+            <a:endParaRPr lang="en-GB" sz="1600" dirty="0"/>
+          </a:p>
+        </p:txBody>
+      </p:sp>
+      <p:sp>
+        <p:nvSpPr>
+          <p:cNvPr id="14" name="TextBox 13"/>
+          <p:cNvSpPr txBox="1"/>
+          <p:nvPr/>
+        </p:nvSpPr>
+        <p:spPr>
+          <a:xfrm>
+            <a:off x="3425188" y="4875625"/>
+            <a:ext cx="5976664" cy="584775"/>
+          </a:xfrm>
+          <a:prstGeom prst="rect">
+            <a:avLst/>
+          </a:prstGeom>
+          <a:noFill/>
+        </p:spPr>
+        <p:txBody>
+          <a:bodyPr wrap="square" rtlCol="0">
+            <a:spAutoFit/>
+          </a:bodyPr>
+          <a:lstStyle/>
+          <a:p>
+            <a:pPr algn="r"/>
+            <a:r>
+              <a:rPr lang="en-GB" sz="3200" b="1" dirty="0" smtClean="0"/>
+              <a:t>Development</a:t>
+            </a:r>
+            <a:endParaRPr lang="en-GB" sz="3200" b="1" dirty="0"/>
+          </a:p>
+        </p:txBody>
+      </p:sp>
+      <p:sp>
+        <p:nvSpPr>
+          <p:cNvPr id="15" name="TextBox 14"/>
+          <p:cNvSpPr txBox="1"/>
+          <p:nvPr/>
+        </p:nvSpPr>
+        <p:spPr>
+          <a:xfrm>
+            <a:off x="173718" y="8984377"/>
+            <a:ext cx="4031622" cy="584775"/>
+          </a:xfrm>
+          <a:prstGeom prst="rect">
+            <a:avLst/>
+          </a:prstGeom>
+          <a:noFill/>
+        </p:spPr>
+        <p:txBody>
+          <a:bodyPr wrap="square" rtlCol="0">
+            <a:spAutoFit/>
+          </a:bodyPr>
+          <a:lstStyle/>
+          <a:p>
+            <a:r>
+              <a:rPr lang="en-GB" sz="3200" b="1" dirty="0" smtClean="0"/>
+              <a:t>Final Product</a:t>
+            </a:r>
+            <a:endParaRPr lang="en-GB" sz="3200" b="1" dirty="0"/>
+          </a:p>
+        </p:txBody>
+      </p:sp>
+      <p:sp>
+        <p:nvSpPr>
+          <p:cNvPr id="16" name="TextBox 15"/>
+          <p:cNvSpPr txBox="1"/>
+          <p:nvPr/>
+        </p:nvSpPr>
+        <p:spPr>
+          <a:xfrm>
+            <a:off x="173717" y="9709100"/>
+            <a:ext cx="3906801" cy="2308324"/>
+          </a:xfrm>
+          <a:prstGeom prst="rect">
+            <a:avLst/>
+          </a:prstGeom>
+          <a:noFill/>
+        </p:spPr>
+        <p:txBody>
+          <a:bodyPr wrap="square" rtlCol="0">
+            <a:spAutoFit/>
+          </a:bodyPr>
+          <a:lstStyle/>
+          <a:p>
+            <a:r>
+              <a:rPr lang="en-GB" sz="1600" dirty="0"/>
+              <a:t>There was a lot of features that were cut for this project due to time constraints. </a:t>
+            </a:r>
+            <a:endParaRPr lang="en-GB" sz="1600" dirty="0" smtClean="0"/>
+          </a:p>
+          <a:p>
+            <a:r>
+              <a:rPr lang="en-GB" sz="1600" dirty="0" smtClean="0"/>
+              <a:t>However in the </a:t>
+            </a:r>
+            <a:r>
+              <a:rPr lang="en-GB" sz="1600" dirty="0" smtClean="0"/>
+              <a:t>final product allows the host client to choose one of two maps and then the host becomes an top down overview (like the picture to the right) which you can then view the connected clients in the game fight.</a:t>
+            </a:r>
+          </a:p>
+          <a:p>
+            <a:endParaRPr lang="en-GB" sz="1600" dirty="0"/>
           </a:p>
         </p:txBody>
       </p:sp>

</xml_diff>